<commit_message>
crewai project adding github link
</commit_message>
<xml_diff>
--- a/images/projects/Presentation1.pptx
+++ b/images/projects/Presentation1.pptx
@@ -244,7 +244,7 @@
           <a:p>
             <a:fld id="{33410655-8652-4A1C-BE76-224AE6BB833E}" type="datetimeFigureOut">
               <a:rPr lang="en-US" smtClean="0"/>
-              <a:t>1/16/2026</a:t>
+              <a:t>1/23/2026</a:t>
             </a:fld>
             <a:endParaRPr lang="en-US"/>
           </a:p>
@@ -414,7 +414,7 @@
           <a:p>
             <a:fld id="{33410655-8652-4A1C-BE76-224AE6BB833E}" type="datetimeFigureOut">
               <a:rPr lang="en-US" smtClean="0"/>
-              <a:t>1/16/2026</a:t>
+              <a:t>1/23/2026</a:t>
             </a:fld>
             <a:endParaRPr lang="en-US"/>
           </a:p>
@@ -594,7 +594,7 @@
           <a:p>
             <a:fld id="{33410655-8652-4A1C-BE76-224AE6BB833E}" type="datetimeFigureOut">
               <a:rPr lang="en-US" smtClean="0"/>
-              <a:t>1/16/2026</a:t>
+              <a:t>1/23/2026</a:t>
             </a:fld>
             <a:endParaRPr lang="en-US"/>
           </a:p>
@@ -764,7 +764,7 @@
           <a:p>
             <a:fld id="{33410655-8652-4A1C-BE76-224AE6BB833E}" type="datetimeFigureOut">
               <a:rPr lang="en-US" smtClean="0"/>
-              <a:t>1/16/2026</a:t>
+              <a:t>1/23/2026</a:t>
             </a:fld>
             <a:endParaRPr lang="en-US"/>
           </a:p>
@@ -1010,7 +1010,7 @@
           <a:p>
             <a:fld id="{33410655-8652-4A1C-BE76-224AE6BB833E}" type="datetimeFigureOut">
               <a:rPr lang="en-US" smtClean="0"/>
-              <a:t>1/16/2026</a:t>
+              <a:t>1/23/2026</a:t>
             </a:fld>
             <a:endParaRPr lang="en-US"/>
           </a:p>
@@ -1242,7 +1242,7 @@
           <a:p>
             <a:fld id="{33410655-8652-4A1C-BE76-224AE6BB833E}" type="datetimeFigureOut">
               <a:rPr lang="en-US" smtClean="0"/>
-              <a:t>1/16/2026</a:t>
+              <a:t>1/23/2026</a:t>
             </a:fld>
             <a:endParaRPr lang="en-US"/>
           </a:p>
@@ -1609,7 +1609,7 @@
           <a:p>
             <a:fld id="{33410655-8652-4A1C-BE76-224AE6BB833E}" type="datetimeFigureOut">
               <a:rPr lang="en-US" smtClean="0"/>
-              <a:t>1/16/2026</a:t>
+              <a:t>1/23/2026</a:t>
             </a:fld>
             <a:endParaRPr lang="en-US"/>
           </a:p>
@@ -1727,7 +1727,7 @@
           <a:p>
             <a:fld id="{33410655-8652-4A1C-BE76-224AE6BB833E}" type="datetimeFigureOut">
               <a:rPr lang="en-US" smtClean="0"/>
-              <a:t>1/16/2026</a:t>
+              <a:t>1/23/2026</a:t>
             </a:fld>
             <a:endParaRPr lang="en-US"/>
           </a:p>
@@ -1822,7 +1822,7 @@
           <a:p>
             <a:fld id="{33410655-8652-4A1C-BE76-224AE6BB833E}" type="datetimeFigureOut">
               <a:rPr lang="en-US" smtClean="0"/>
-              <a:t>1/16/2026</a:t>
+              <a:t>1/23/2026</a:t>
             </a:fld>
             <a:endParaRPr lang="en-US"/>
           </a:p>
@@ -2099,7 +2099,7 @@
           <a:p>
             <a:fld id="{33410655-8652-4A1C-BE76-224AE6BB833E}" type="datetimeFigureOut">
               <a:rPr lang="en-US" smtClean="0"/>
-              <a:t>1/16/2026</a:t>
+              <a:t>1/23/2026</a:t>
             </a:fld>
             <a:endParaRPr lang="en-US"/>
           </a:p>
@@ -2356,7 +2356,7 @@
           <a:p>
             <a:fld id="{33410655-8652-4A1C-BE76-224AE6BB833E}" type="datetimeFigureOut">
               <a:rPr lang="en-US" smtClean="0"/>
-              <a:t>1/16/2026</a:t>
+              <a:t>1/23/2026</a:t>
             </a:fld>
             <a:endParaRPr lang="en-US"/>
           </a:p>
@@ -2569,7 +2569,7 @@
           <a:p>
             <a:fld id="{33410655-8652-4A1C-BE76-224AE6BB833E}" type="datetimeFigureOut">
               <a:rPr lang="en-US" smtClean="0"/>
-              <a:t>1/16/2026</a:t>
+              <a:t>1/23/2026</a:t>
             </a:fld>
             <a:endParaRPr lang="en-US"/>
           </a:p>
@@ -3373,8 +3373,8 @@
         </p:nvSpPr>
         <p:spPr>
           <a:xfrm>
-            <a:off x="2379130" y="1574808"/>
-            <a:ext cx="1642532" cy="615150"/>
+            <a:off x="2379130" y="1017927"/>
+            <a:ext cx="1642532" cy="453368"/>
           </a:xfrm>
           <a:prstGeom prst="roundRect">
             <a:avLst/>
@@ -3408,8 +3408,8 @@
           <a:p>
             <a:pPr algn="ctr"/>
             <a:r>
-              <a:rPr lang="en-US" sz="1600" dirty="0"/>
-              <a:t>Web Research Agent</a:t>
+              <a:rPr lang="en-US" sz="1400" dirty="0"/>
+              <a:t>Researcher Agent</a:t>
             </a:r>
           </a:p>
         </p:txBody>
@@ -3428,8 +3428,8 @@
         </p:nvSpPr>
         <p:spPr>
           <a:xfrm>
-            <a:off x="4656664" y="1574809"/>
-            <a:ext cx="1642532" cy="615150"/>
+            <a:off x="4656664" y="1017928"/>
+            <a:ext cx="1642532" cy="453368"/>
           </a:xfrm>
           <a:prstGeom prst="roundRect">
             <a:avLst/>
@@ -3463,8 +3463,8 @@
           <a:p>
             <a:pPr algn="ctr"/>
             <a:r>
-              <a:rPr lang="en-US" sz="1600" dirty="0"/>
-              <a:t>Text Analysis Agent</a:t>
+              <a:rPr lang="en-US" sz="1400" dirty="0"/>
+              <a:t>Writer Agent</a:t>
             </a:r>
           </a:p>
         </p:txBody>
@@ -3483,8 +3483,8 @@
         </p:nvSpPr>
         <p:spPr>
           <a:xfrm>
-            <a:off x="6934198" y="1574807"/>
-            <a:ext cx="1642532" cy="615150"/>
+            <a:off x="6934198" y="1017926"/>
+            <a:ext cx="1642532" cy="453368"/>
           </a:xfrm>
           <a:prstGeom prst="roundRect">
             <a:avLst/>
@@ -3518,8 +3518,8 @@
           <a:p>
             <a:pPr algn="ctr"/>
             <a:r>
-              <a:rPr lang="en-US" sz="1600" dirty="0"/>
-              <a:t>Summary Agent</a:t>
+              <a:rPr lang="en-US" sz="1400" dirty="0"/>
+              <a:t>Editor Agent</a:t>
             </a:r>
           </a:p>
         </p:txBody>
@@ -3553,8 +3553,8 @@
         </p:blipFill>
         <p:spPr bwMode="auto">
           <a:xfrm>
-            <a:off x="2918676" y="1063754"/>
-            <a:ext cx="553244" cy="553244"/>
+            <a:off x="2918676" y="658125"/>
+            <a:ext cx="553244" cy="407743"/>
           </a:xfrm>
           <a:prstGeom prst="rect">
             <a:avLst/>
@@ -3600,8 +3600,8 @@
         </p:blipFill>
         <p:spPr bwMode="auto">
           <a:xfrm>
-            <a:off x="5198988" y="1063754"/>
-            <a:ext cx="553244" cy="553244"/>
+            <a:off x="5198988" y="658125"/>
+            <a:ext cx="553244" cy="407743"/>
           </a:xfrm>
           <a:prstGeom prst="rect">
             <a:avLst/>
@@ -3647,8 +3647,8 @@
         </p:blipFill>
         <p:spPr bwMode="auto">
           <a:xfrm>
-            <a:off x="7476522" y="1063754"/>
-            <a:ext cx="553244" cy="553244"/>
+            <a:off x="7476522" y="658125"/>
+            <a:ext cx="553244" cy="407743"/>
           </a:xfrm>
           <a:prstGeom prst="rect">
             <a:avLst/>
@@ -3683,7 +3683,7 @@
         </p:nvCxnSpPr>
         <p:spPr>
           <a:xfrm>
-            <a:off x="4021662" y="1882383"/>
+            <a:off x="4021662" y="1244611"/>
             <a:ext cx="635002" cy="1"/>
           </a:xfrm>
           <a:prstGeom prst="straightConnector1">
@@ -3729,7 +3729,7 @@
         </p:nvCxnSpPr>
         <p:spPr>
           <a:xfrm flipV="1">
-            <a:off x="6299196" y="1882382"/>
+            <a:off x="6299196" y="1244610"/>
             <a:ext cx="635002" cy="2"/>
           </a:xfrm>
           <a:prstGeom prst="straightConnector1">
@@ -3771,8 +3771,8 @@
         </p:nvSpPr>
         <p:spPr>
           <a:xfrm>
-            <a:off x="2218263" y="990601"/>
-            <a:ext cx="6527804" cy="1351771"/>
+            <a:off x="2218263" y="584398"/>
+            <a:ext cx="6527804" cy="2118483"/>
           </a:xfrm>
           <a:prstGeom prst="roundRect">
             <a:avLst/>
@@ -3806,7 +3806,7 @@
           <a:lstStyle/>
           <a:p>
             <a:pPr algn="ctr"/>
-            <a:endParaRPr lang="en-US" dirty="0"/>
+            <a:endParaRPr lang="en-US" sz="1400" dirty="0"/>
           </a:p>
         </p:txBody>
       </p:sp>
@@ -3933,7 +3933,7 @@
         </p:blipFill>
         <p:spPr bwMode="auto">
           <a:xfrm>
-            <a:off x="3134182" y="2723861"/>
+            <a:off x="3127307" y="3026371"/>
             <a:ext cx="561577" cy="561577"/>
           </a:xfrm>
           <a:prstGeom prst="rect">
@@ -3980,7 +3980,7 @@
         </p:blipFill>
         <p:spPr bwMode="auto">
           <a:xfrm>
-            <a:off x="7291778" y="2723861"/>
+            <a:off x="7284903" y="3026371"/>
             <a:ext cx="561577" cy="561577"/>
           </a:xfrm>
           <a:prstGeom prst="rect">
@@ -4015,7 +4015,7 @@
         </p:nvCxnSpPr>
         <p:spPr>
           <a:xfrm>
-            <a:off x="3695759" y="3004650"/>
+            <a:off x="3688884" y="3307160"/>
             <a:ext cx="3596019" cy="0"/>
           </a:xfrm>
           <a:prstGeom prst="line">
@@ -4071,7 +4071,7 @@
         </p:blipFill>
         <p:spPr bwMode="auto">
           <a:xfrm>
-            <a:off x="5212980" y="2720446"/>
+            <a:off x="5206105" y="3022956"/>
             <a:ext cx="561577" cy="561577"/>
           </a:xfrm>
           <a:prstGeom prst="rect">
@@ -4106,8 +4106,8 @@
         </p:nvCxnSpPr>
         <p:spPr>
           <a:xfrm>
-            <a:off x="5482165" y="2342372"/>
-            <a:ext cx="11056" cy="384906"/>
+            <a:off x="5482165" y="2702881"/>
+            <a:ext cx="11056" cy="326907"/>
           </a:xfrm>
           <a:prstGeom prst="line">
             <a:avLst/>
@@ -4147,7 +4147,7 @@
         </p:nvSpPr>
         <p:spPr>
           <a:xfrm>
-            <a:off x="2593704" y="3666924"/>
+            <a:off x="2586829" y="3969434"/>
             <a:ext cx="1642532" cy="561575"/>
           </a:xfrm>
           <a:prstGeom prst="roundRect">
@@ -4182,14 +4182,14 @@
           <a:p>
             <a:pPr algn="ctr"/>
             <a:r>
-              <a:rPr lang="en-US" sz="1600" dirty="0"/>
+              <a:rPr lang="en-US" sz="1400" dirty="0"/>
               <a:t>Web Search</a:t>
             </a:r>
           </a:p>
           <a:p>
             <a:pPr algn="ctr"/>
             <a:r>
-              <a:rPr lang="en-US" sz="1600" dirty="0"/>
+              <a:rPr lang="en-US" sz="1400" dirty="0"/>
               <a:t>Tool</a:t>
             </a:r>
           </a:p>
@@ -4209,7 +4209,7 @@
         </p:nvSpPr>
         <p:spPr>
           <a:xfrm>
-            <a:off x="4671955" y="3666924"/>
+            <a:off x="4665080" y="3969434"/>
             <a:ext cx="1642532" cy="561575"/>
           </a:xfrm>
           <a:prstGeom prst="roundRect">
@@ -4244,14 +4244,14 @@
           <a:p>
             <a:pPr algn="ctr"/>
             <a:r>
-              <a:rPr lang="en-US" sz="1600" dirty="0"/>
+              <a:rPr lang="en-US" sz="1400" dirty="0"/>
               <a:t>Page Scraper</a:t>
             </a:r>
           </a:p>
           <a:p>
             <a:pPr algn="ctr"/>
             <a:r>
-              <a:rPr lang="en-US" sz="1600" dirty="0"/>
+              <a:rPr lang="en-US" sz="1400" dirty="0"/>
               <a:t>Tool</a:t>
             </a:r>
           </a:p>
@@ -4271,7 +4271,7 @@
         </p:nvSpPr>
         <p:spPr>
           <a:xfrm>
-            <a:off x="6751300" y="3662850"/>
+            <a:off x="6744425" y="3965360"/>
             <a:ext cx="1642532" cy="561575"/>
           </a:xfrm>
           <a:prstGeom prst="roundRect">
@@ -4306,14 +4306,14 @@
           <a:p>
             <a:pPr algn="ctr"/>
             <a:r>
-              <a:rPr lang="en-US" sz="1600" dirty="0"/>
+              <a:rPr lang="en-US" sz="1400" dirty="0"/>
               <a:t>File Manager</a:t>
             </a:r>
           </a:p>
           <a:p>
             <a:pPr algn="ctr"/>
             <a:r>
-              <a:rPr lang="en-US" sz="1600" dirty="0"/>
+              <a:rPr lang="en-US" sz="1400" dirty="0"/>
               <a:t>Tool</a:t>
             </a:r>
           </a:p>
@@ -4337,7 +4337,7 @@
         </p:nvCxnSpPr>
         <p:spPr>
           <a:xfrm flipH="1">
-            <a:off x="7572566" y="3285438"/>
+            <a:off x="7565691" y="3587948"/>
             <a:ext cx="1" cy="377412"/>
           </a:xfrm>
           <a:prstGeom prst="straightConnector1">
@@ -4383,7 +4383,7 @@
         </p:nvCxnSpPr>
         <p:spPr>
           <a:xfrm flipH="1">
-            <a:off x="5493221" y="3282023"/>
+            <a:off x="5486346" y="3584533"/>
             <a:ext cx="548" cy="384901"/>
           </a:xfrm>
           <a:prstGeom prst="straightConnector1">
@@ -4429,7 +4429,7 @@
         </p:nvCxnSpPr>
         <p:spPr>
           <a:xfrm flipH="1">
-            <a:off x="3414970" y="3285438"/>
+            <a:off x="3408095" y="3587948"/>
             <a:ext cx="1" cy="381486"/>
           </a:xfrm>
           <a:prstGeom prst="straightConnector1">
@@ -4471,8 +4471,8 @@
         </p:nvSpPr>
         <p:spPr>
           <a:xfrm>
-            <a:off x="2053695" y="660407"/>
-            <a:ext cx="6895571" cy="3773366"/>
+            <a:off x="2053695" y="226881"/>
+            <a:ext cx="6895571" cy="4620128"/>
           </a:xfrm>
           <a:prstGeom prst="rect">
             <a:avLst/>
@@ -4506,7 +4506,7 @@
           <a:lstStyle/>
           <a:p>
             <a:pPr algn="ctr"/>
-            <a:endParaRPr lang="en-US"/>
+            <a:endParaRPr lang="en-US" sz="1400"/>
           </a:p>
         </p:txBody>
       </p:sp>
@@ -4527,9 +4527,9 @@
           <p:nvPr/>
         </p:nvCxnSpPr>
         <p:spPr>
-          <a:xfrm flipV="1">
-            <a:off x="8949266" y="2544740"/>
-            <a:ext cx="702098" cy="2350"/>
+          <a:xfrm>
+            <a:off x="8949266" y="2536945"/>
+            <a:ext cx="702098" cy="7795"/>
           </a:xfrm>
           <a:prstGeom prst="straightConnector1">
             <a:avLst/>
@@ -4574,8 +4574,8 @@
         </p:nvCxnSpPr>
         <p:spPr>
           <a:xfrm flipV="1">
-            <a:off x="1285039" y="2547090"/>
-            <a:ext cx="768656" cy="747"/>
+            <a:off x="1285039" y="2536945"/>
+            <a:ext cx="768656" cy="10892"/>
           </a:xfrm>
           <a:prstGeom prst="straightConnector1">
             <a:avLst/>
@@ -4584,6 +4584,312 @@
             <a:solidFill>
               <a:srgbClr val="D9D2C8"/>
             </a:solidFill>
+            <a:tailEnd type="arrow"/>
+          </a:ln>
+        </p:spPr>
+        <p:style>
+          <a:lnRef idx="2">
+            <a:schemeClr val="accent1"/>
+          </a:lnRef>
+          <a:fillRef idx="0">
+            <a:schemeClr val="accent1"/>
+          </a:fillRef>
+          <a:effectRef idx="1">
+            <a:schemeClr val="accent1"/>
+          </a:effectRef>
+          <a:fontRef idx="minor">
+            <a:schemeClr val="tx1"/>
+          </a:fontRef>
+        </p:style>
+      </p:cxnSp>
+      <p:sp>
+        <p:nvSpPr>
+          <p:cNvPr id="17" name="Rectangle: Rounded Corners 16">
+            <a:extLst>
+              <a:ext uri="{FF2B5EF4-FFF2-40B4-BE49-F238E27FC236}">
+                <a16:creationId xmlns:a16="http://schemas.microsoft.com/office/drawing/2014/main" id="{D9881745-3D55-4E4D-9F96-0BA991E45EE0}"/>
+              </a:ext>
+            </a:extLst>
+          </p:cNvPr>
+          <p:cNvSpPr/>
+          <p:nvPr/>
+        </p:nvSpPr>
+        <p:spPr>
+          <a:xfrm>
+            <a:off x="2380277" y="1892226"/>
+            <a:ext cx="1642532" cy="453368"/>
+          </a:xfrm>
+          <a:prstGeom prst="roundRect">
+            <a:avLst/>
+          </a:prstGeom>
+          <a:noFill/>
+          <a:ln w="19050">
+            <a:solidFill>
+              <a:srgbClr val="D9D2C8"/>
+            </a:solidFill>
+          </a:ln>
+        </p:spPr>
+        <p:style>
+          <a:lnRef idx="2">
+            <a:schemeClr val="accent1">
+              <a:shade val="15000"/>
+            </a:schemeClr>
+          </a:lnRef>
+          <a:fillRef idx="1">
+            <a:schemeClr val="accent1"/>
+          </a:fillRef>
+          <a:effectRef idx="0">
+            <a:schemeClr val="accent1"/>
+          </a:effectRef>
+          <a:fontRef idx="minor">
+            <a:schemeClr val="lt1"/>
+          </a:fontRef>
+        </p:style>
+        <p:txBody>
+          <a:bodyPr rtlCol="0" anchor="ctr"/>
+          <a:lstStyle/>
+          <a:p>
+            <a:pPr algn="ctr"/>
+            <a:r>
+              <a:rPr lang="en-US" sz="1400" dirty="0"/>
+              <a:t>Researcher Task</a:t>
+            </a:r>
+          </a:p>
+        </p:txBody>
+      </p:sp>
+      <p:sp>
+        <p:nvSpPr>
+          <p:cNvPr id="18" name="Rectangle: Rounded Corners 17">
+            <a:extLst>
+              <a:ext uri="{FF2B5EF4-FFF2-40B4-BE49-F238E27FC236}">
+                <a16:creationId xmlns:a16="http://schemas.microsoft.com/office/drawing/2014/main" id="{F165E03A-A92C-6975-7D49-742721E41489}"/>
+              </a:ext>
+            </a:extLst>
+          </p:cNvPr>
+          <p:cNvSpPr/>
+          <p:nvPr/>
+        </p:nvSpPr>
+        <p:spPr>
+          <a:xfrm>
+            <a:off x="4657811" y="1892227"/>
+            <a:ext cx="1642532" cy="453368"/>
+          </a:xfrm>
+          <a:prstGeom prst="roundRect">
+            <a:avLst/>
+          </a:prstGeom>
+          <a:noFill/>
+          <a:ln w="19050">
+            <a:solidFill>
+              <a:srgbClr val="D9D2C8"/>
+            </a:solidFill>
+          </a:ln>
+        </p:spPr>
+        <p:style>
+          <a:lnRef idx="2">
+            <a:schemeClr val="accent1">
+              <a:shade val="15000"/>
+            </a:schemeClr>
+          </a:lnRef>
+          <a:fillRef idx="1">
+            <a:schemeClr val="accent1"/>
+          </a:fillRef>
+          <a:effectRef idx="0">
+            <a:schemeClr val="accent1"/>
+          </a:effectRef>
+          <a:fontRef idx="minor">
+            <a:schemeClr val="lt1"/>
+          </a:fontRef>
+        </p:style>
+        <p:txBody>
+          <a:bodyPr rtlCol="0" anchor="ctr"/>
+          <a:lstStyle/>
+          <a:p>
+            <a:pPr algn="ctr"/>
+            <a:r>
+              <a:rPr lang="en-US" sz="1400" dirty="0"/>
+              <a:t>Writer Task</a:t>
+            </a:r>
+          </a:p>
+        </p:txBody>
+      </p:sp>
+      <p:sp>
+        <p:nvSpPr>
+          <p:cNvPr id="19" name="Rectangle: Rounded Corners 18">
+            <a:extLst>
+              <a:ext uri="{FF2B5EF4-FFF2-40B4-BE49-F238E27FC236}">
+                <a16:creationId xmlns:a16="http://schemas.microsoft.com/office/drawing/2014/main" id="{6578ABF8-3AC0-DBEC-0A66-71B26F806DF1}"/>
+              </a:ext>
+            </a:extLst>
+          </p:cNvPr>
+          <p:cNvSpPr/>
+          <p:nvPr/>
+        </p:nvSpPr>
+        <p:spPr>
+          <a:xfrm>
+            <a:off x="6935345" y="1892225"/>
+            <a:ext cx="1642532" cy="453368"/>
+          </a:xfrm>
+          <a:prstGeom prst="roundRect">
+            <a:avLst/>
+          </a:prstGeom>
+          <a:noFill/>
+          <a:ln w="19050">
+            <a:solidFill>
+              <a:srgbClr val="D9D2C8"/>
+            </a:solidFill>
+          </a:ln>
+        </p:spPr>
+        <p:style>
+          <a:lnRef idx="2">
+            <a:schemeClr val="accent1">
+              <a:shade val="15000"/>
+            </a:schemeClr>
+          </a:lnRef>
+          <a:fillRef idx="1">
+            <a:schemeClr val="accent1"/>
+          </a:fillRef>
+          <a:effectRef idx="0">
+            <a:schemeClr val="accent1"/>
+          </a:effectRef>
+          <a:fontRef idx="minor">
+            <a:schemeClr val="lt1"/>
+          </a:fontRef>
+        </p:style>
+        <p:txBody>
+          <a:bodyPr rtlCol="0" anchor="ctr"/>
+          <a:lstStyle/>
+          <a:p>
+            <a:pPr algn="ctr"/>
+            <a:r>
+              <a:rPr lang="en-US" sz="1400" dirty="0"/>
+              <a:t>Editor Task</a:t>
+            </a:r>
+          </a:p>
+        </p:txBody>
+      </p:sp>
+      <p:cxnSp>
+        <p:nvCxnSpPr>
+          <p:cNvPr id="33" name="Straight Arrow Connector 32">
+            <a:extLst>
+              <a:ext uri="{FF2B5EF4-FFF2-40B4-BE49-F238E27FC236}">
+                <a16:creationId xmlns:a16="http://schemas.microsoft.com/office/drawing/2014/main" id="{C11543F9-B3D7-E695-FB47-26F74A5156C4}"/>
+              </a:ext>
+            </a:extLst>
+          </p:cNvPr>
+          <p:cNvCxnSpPr>
+            <a:cxnSpLocks/>
+            <a:stCxn id="17" idx="0"/>
+            <a:endCxn id="2" idx="2"/>
+          </p:cNvCxnSpPr>
+          <p:nvPr/>
+        </p:nvCxnSpPr>
+        <p:spPr>
+          <a:xfrm flipH="1" flipV="1">
+            <a:off x="3200396" y="1471295"/>
+            <a:ext cx="1147" cy="420931"/>
+          </a:xfrm>
+          <a:prstGeom prst="straightConnector1">
+            <a:avLst/>
+          </a:prstGeom>
+          <a:ln w="19050">
+            <a:solidFill>
+              <a:srgbClr val="D9D2C8"/>
+            </a:solidFill>
+            <a:prstDash val="sysDash"/>
+            <a:tailEnd type="arrow"/>
+          </a:ln>
+        </p:spPr>
+        <p:style>
+          <a:lnRef idx="2">
+            <a:schemeClr val="accent1"/>
+          </a:lnRef>
+          <a:fillRef idx="0">
+            <a:schemeClr val="accent1"/>
+          </a:fillRef>
+          <a:effectRef idx="1">
+            <a:schemeClr val="accent1"/>
+          </a:effectRef>
+          <a:fontRef idx="minor">
+            <a:schemeClr val="tx1"/>
+          </a:fontRef>
+        </p:style>
+      </p:cxnSp>
+      <p:cxnSp>
+        <p:nvCxnSpPr>
+          <p:cNvPr id="40" name="Straight Arrow Connector 39">
+            <a:extLst>
+              <a:ext uri="{FF2B5EF4-FFF2-40B4-BE49-F238E27FC236}">
+                <a16:creationId xmlns:a16="http://schemas.microsoft.com/office/drawing/2014/main" id="{5BE8151F-4D1B-C1B0-D90C-FEAC3DAD766E}"/>
+              </a:ext>
+            </a:extLst>
+          </p:cNvPr>
+          <p:cNvCxnSpPr>
+            <a:cxnSpLocks/>
+            <a:stCxn id="18" idx="0"/>
+            <a:endCxn id="3" idx="2"/>
+          </p:cNvCxnSpPr>
+          <p:nvPr/>
+        </p:nvCxnSpPr>
+        <p:spPr>
+          <a:xfrm flipH="1" flipV="1">
+            <a:off x="5477930" y="1471296"/>
+            <a:ext cx="1147" cy="420931"/>
+          </a:xfrm>
+          <a:prstGeom prst="straightConnector1">
+            <a:avLst/>
+          </a:prstGeom>
+          <a:ln w="19050">
+            <a:solidFill>
+              <a:srgbClr val="D9D2C8"/>
+            </a:solidFill>
+            <a:prstDash val="sysDash"/>
+            <a:tailEnd type="arrow"/>
+          </a:ln>
+        </p:spPr>
+        <p:style>
+          <a:lnRef idx="2">
+            <a:schemeClr val="accent1"/>
+          </a:lnRef>
+          <a:fillRef idx="0">
+            <a:schemeClr val="accent1"/>
+          </a:fillRef>
+          <a:effectRef idx="1">
+            <a:schemeClr val="accent1"/>
+          </a:effectRef>
+          <a:fontRef idx="minor">
+            <a:schemeClr val="tx1"/>
+          </a:fontRef>
+        </p:style>
+      </p:cxnSp>
+      <p:cxnSp>
+        <p:nvCxnSpPr>
+          <p:cNvPr id="43" name="Straight Arrow Connector 42">
+            <a:extLst>
+              <a:ext uri="{FF2B5EF4-FFF2-40B4-BE49-F238E27FC236}">
+                <a16:creationId xmlns:a16="http://schemas.microsoft.com/office/drawing/2014/main" id="{388758EB-C8A6-E9D8-DA73-9A40BAC5D269}"/>
+              </a:ext>
+            </a:extLst>
+          </p:cNvPr>
+          <p:cNvCxnSpPr>
+            <a:cxnSpLocks/>
+            <a:stCxn id="19" idx="0"/>
+            <a:endCxn id="4" idx="2"/>
+          </p:cNvCxnSpPr>
+          <p:nvPr/>
+        </p:nvCxnSpPr>
+        <p:spPr>
+          <a:xfrm flipH="1" flipV="1">
+            <a:off x="7755464" y="1471294"/>
+            <a:ext cx="1147" cy="420931"/>
+          </a:xfrm>
+          <a:prstGeom prst="straightConnector1">
+            <a:avLst/>
+          </a:prstGeom>
+          <a:ln w="19050">
+            <a:solidFill>
+              <a:srgbClr val="D9D2C8"/>
+            </a:solidFill>
+            <a:prstDash val="sysDash"/>
             <a:tailEnd type="arrow"/>
           </a:ln>
         </p:spPr>

</xml_diff>